<commit_message>
fix presentation after discussion
</commit_message>
<xml_diff>
--- a/Lab 3/Lab 3 - presentation.pptx
+++ b/Lab 3/Lab 3 - presentation.pptx
@@ -122,10 +122,22 @@
 </p:presentation>
 </file>
 
+<file path=ppt/commentAuthors.xml><?xml version="1.0" encoding="utf-8"?>
+<p:cmAuthorLst xmlns:a="http://schemas.openxmlformats.org/drawingml/2006/main" xmlns:r="http://schemas.openxmlformats.org/officeDocument/2006/relationships" xmlns:p="http://schemas.openxmlformats.org/presentationml/2006/main">
+  <p:cmAuthor id="1" name="Franco Ruggeri" initials="FR" lastIdx="1" clrIdx="0">
+    <p:extLst>
+      <p:ext uri="{19B8F6BF-5375-455C-9EA6-DF929625EA0E}">
+        <p15:presenceInfo xmlns:p15="http://schemas.microsoft.com/office/powerpoint/2012/main" userId="f8fb41c0b3afb4f0" providerId="Windows Live"/>
+      </p:ext>
+    </p:extLst>
+  </p:cmAuthor>
+</p:cmAuthorLst>
+</file>
+
 <file path=ppt/revisionInfo.xml><?xml version="1.0" encoding="utf-8"?>
 <p1510:revInfo xmlns:a="http://schemas.openxmlformats.org/drawingml/2006/main" xmlns:r="http://schemas.openxmlformats.org/officeDocument/2006/relationships" xmlns:p1510="http://schemas.microsoft.com/office/powerpoint/2015/10/main">
   <p1510:revLst>
-    <p1510:client id="{D8044BFB-ECB7-4860-8B53-8AB623343355}" v="169" dt="2019-10-23T00:55:28.836"/>
+    <p1510:client id="{D8044BFB-ECB7-4860-8B53-8AB623343355}" v="178" dt="2019-10-23T16:32:08.887"/>
   </p1510:revLst>
 </p1510:revInfo>
 </file>
@@ -135,7 +147,7 @@
   <pc:docChgLst>
     <pc:chgData name="Franco Ruggeri" userId="f8fb41c0b3afb4f0" providerId="LiveId" clId="{D8044BFB-ECB7-4860-8B53-8AB623343355}"/>
     <pc:docChg chg="undo custSel mod addSld delSld modSld sldOrd">
-      <pc:chgData name="Franco Ruggeri" userId="f8fb41c0b3afb4f0" providerId="LiveId" clId="{D8044BFB-ECB7-4860-8B53-8AB623343355}" dt="2019-10-23T01:05:16.756" v="3539" actId="20577"/>
+      <pc:chgData name="Franco Ruggeri" userId="f8fb41c0b3afb4f0" providerId="LiveId" clId="{D8044BFB-ECB7-4860-8B53-8AB623343355}" dt="2019-10-23T16:32:29.596" v="4931" actId="1076"/>
       <pc:docMkLst>
         <pc:docMk/>
       </pc:docMkLst>
@@ -525,14 +537,22 @@
           </ac:spMkLst>
         </pc:spChg>
       </pc:sldChg>
-      <pc:sldChg chg="addSp delSp modSp add">
-        <pc:chgData name="Franco Ruggeri" userId="f8fb41c0b3afb4f0" providerId="LiveId" clId="{D8044BFB-ECB7-4860-8B53-8AB623343355}" dt="2019-10-23T00:20:56.677" v="2373" actId="113"/>
+      <pc:sldChg chg="addSp delSp modSp add addCm">
+        <pc:chgData name="Franco Ruggeri" userId="f8fb41c0b3afb4f0" providerId="LiveId" clId="{D8044BFB-ECB7-4860-8B53-8AB623343355}" dt="2019-10-23T16:29:09.159" v="4899"/>
         <pc:sldMkLst>
           <pc:docMk/>
           <pc:sldMk cId="4200235255" sldId="275"/>
         </pc:sldMkLst>
+        <pc:spChg chg="add del mod">
+          <ac:chgData name="Franco Ruggeri" userId="f8fb41c0b3afb4f0" providerId="LiveId" clId="{D8044BFB-ECB7-4860-8B53-8AB623343355}" dt="2019-10-23T16:29:09.159" v="4899"/>
+          <ac:spMkLst>
+            <pc:docMk/>
+            <pc:sldMk cId="4200235255" sldId="275"/>
+            <ac:spMk id="2" creationId="{B015CD00-7A0D-4903-8C73-67FD0E669DB4}"/>
+          </ac:spMkLst>
+        </pc:spChg>
         <pc:spChg chg="mod">
-          <ac:chgData name="Franco Ruggeri" userId="f8fb41c0b3afb4f0" providerId="LiveId" clId="{D8044BFB-ECB7-4860-8B53-8AB623343355}" dt="2019-10-23T00:20:56.677" v="2373" actId="113"/>
+          <ac:chgData name="Franco Ruggeri" userId="f8fb41c0b3afb4f0" providerId="LiveId" clId="{D8044BFB-ECB7-4860-8B53-8AB623343355}" dt="2019-10-23T16:27:44.787" v="4663" actId="1076"/>
           <ac:spMkLst>
             <pc:docMk/>
             <pc:sldMk cId="4200235255" sldId="275"/>
@@ -1048,11 +1068,19 @@
         </pc:picChg>
       </pc:sldChg>
       <pc:sldChg chg="addSp delSp modSp add mod setBg delDesignElem">
-        <pc:chgData name="Franco Ruggeri" userId="f8fb41c0b3afb4f0" providerId="LiveId" clId="{D8044BFB-ECB7-4860-8B53-8AB623343355}" dt="2019-10-23T00:46:51.242" v="2802" actId="26606"/>
+        <pc:chgData name="Franco Ruggeri" userId="f8fb41c0b3afb4f0" providerId="LiveId" clId="{D8044BFB-ECB7-4860-8B53-8AB623343355}" dt="2019-10-23T16:32:29.596" v="4931" actId="1076"/>
         <pc:sldMkLst>
           <pc:docMk/>
           <pc:sldMk cId="3402406186" sldId="286"/>
         </pc:sldMkLst>
+        <pc:spChg chg="add mod">
+          <ac:chgData name="Franco Ruggeri" userId="f8fb41c0b3afb4f0" providerId="LiveId" clId="{D8044BFB-ECB7-4860-8B53-8AB623343355}" dt="2019-10-23T16:32:29.596" v="4931" actId="1076"/>
+          <ac:spMkLst>
+            <pc:docMk/>
+            <pc:sldMk cId="3402406186" sldId="286"/>
+            <ac:spMk id="2" creationId="{20E06728-F827-4703-A1C9-7E08B5FF0B6A}"/>
+          </ac:spMkLst>
+        </pc:spChg>
         <pc:spChg chg="mod">
           <ac:chgData name="Franco Ruggeri" userId="f8fb41c0b3afb4f0" providerId="LiveId" clId="{D8044BFB-ECB7-4860-8B53-8AB623343355}" dt="2019-10-23T00:46:37.123" v="2791" actId="26606"/>
           <ac:spMkLst>
@@ -1062,11 +1090,27 @@
           </ac:spMkLst>
         </pc:spChg>
         <pc:spChg chg="add del mod">
+          <ac:chgData name="Franco Ruggeri" userId="f8fb41c0b3afb4f0" providerId="LiveId" clId="{D8044BFB-ECB7-4860-8B53-8AB623343355}" dt="2019-10-23T16:31:29.833" v="4923" actId="478"/>
+          <ac:spMkLst>
+            <pc:docMk/>
+            <pc:sldMk cId="3402406186" sldId="286"/>
+            <ac:spMk id="4" creationId="{96E7F5DB-44D5-4B7A-9E90-52BD2F80EE5A}"/>
+          </ac:spMkLst>
+        </pc:spChg>
+        <pc:spChg chg="add del mod">
           <ac:chgData name="Franco Ruggeri" userId="f8fb41c0b3afb4f0" providerId="LiveId" clId="{D8044BFB-ECB7-4860-8B53-8AB623343355}" dt="2019-10-23T00:46:19.058" v="2786" actId="478"/>
           <ac:spMkLst>
             <pc:docMk/>
             <pc:sldMk cId="3402406186" sldId="286"/>
             <ac:spMk id="5" creationId="{FA1FAC15-08EC-4E01-8EDD-2DFDDAD3DC88}"/>
+          </ac:spMkLst>
+        </pc:spChg>
+        <pc:spChg chg="add del mod">
+          <ac:chgData name="Franco Ruggeri" userId="f8fb41c0b3afb4f0" providerId="LiveId" clId="{D8044BFB-ECB7-4860-8B53-8AB623343355}" dt="2019-10-23T16:30:03.814" v="4911" actId="478"/>
+          <ac:spMkLst>
+            <pc:docMk/>
+            <pc:sldMk cId="3402406186" sldId="286"/>
+            <ac:spMk id="7" creationId="{60BF53EE-1E84-4FBA-8FBC-7521111C5DD0}"/>
           </ac:spMkLst>
         </pc:spChg>
         <pc:spChg chg="mod">
@@ -1159,13 +1203,13 @@
         </pc:picChg>
       </pc:sldChg>
       <pc:sldChg chg="delSp modSp add setBg delDesignElem">
-        <pc:chgData name="Franco Ruggeri" userId="f8fb41c0b3afb4f0" providerId="LiveId" clId="{D8044BFB-ECB7-4860-8B53-8AB623343355}" dt="2019-10-23T01:05:16.756" v="3539" actId="20577"/>
+        <pc:chgData name="Franco Ruggeri" userId="f8fb41c0b3afb4f0" providerId="LiveId" clId="{D8044BFB-ECB7-4860-8B53-8AB623343355}" dt="2019-10-23T16:24:40.311" v="4660" actId="20577"/>
         <pc:sldMkLst>
           <pc:docMk/>
           <pc:sldMk cId="4048875456" sldId="287"/>
         </pc:sldMkLst>
         <pc:spChg chg="mod">
-          <ac:chgData name="Franco Ruggeri" userId="f8fb41c0b3afb4f0" providerId="LiveId" clId="{D8044BFB-ECB7-4860-8B53-8AB623343355}" dt="2019-10-23T01:05:16.756" v="3539" actId="20577"/>
+          <ac:chgData name="Franco Ruggeri" userId="f8fb41c0b3afb4f0" providerId="LiveId" clId="{D8044BFB-ECB7-4860-8B53-8AB623343355}" dt="2019-10-23T16:24:40.311" v="4660" actId="20577"/>
           <ac:spMkLst>
             <pc:docMk/>
             <pc:sldMk cId="4048875456" sldId="287"/>
@@ -1688,6 +1732,20 @@
     </pc:docChg>
   </pc:docChgLst>
 </pc:chgInfo>
+</file>
+
+<file path=ppt/comments/comment1.xml><?xml version="1.0" encoding="utf-8"?>
+<p:cmLst xmlns:a="http://schemas.openxmlformats.org/drawingml/2006/main" xmlns:r="http://schemas.openxmlformats.org/officeDocument/2006/relationships" xmlns:p="http://schemas.openxmlformats.org/presentationml/2006/main">
+  <p:cm authorId="1" dt="2019-10-23T18:27:31.208" idx="1">
+    <p:pos x="10" y="10"/>
+    <p:text/>
+    <p:extLst>
+      <p:ext uri="{C676402C-5697-4E1C-873F-D02D1690AC5C}">
+        <p15:threadingInfo xmlns:p15="http://schemas.microsoft.com/office/powerpoint/2012/main" timeZoneBias="-120"/>
+      </p:ext>
+    </p:extLst>
+  </p:cm>
+</p:cmLst>
 </file>
 
 <file path=ppt/slideLayouts/slideLayout1.xml><?xml version="1.0" encoding="utf-8"?>
@@ -7870,28 +7928,9 @@
               </a:rPr>
               <a:t>Accuracy</a:t>
             </a:r>
-            <a:endParaRPr lang="en-US" kern="1200">
-              <a:solidFill>
-                <a:schemeClr val="tx1"/>
-              </a:solidFill>
-              <a:latin typeface="+mn-lt"/>
-              <a:ea typeface="+mn-ea"/>
-              <a:cs typeface="+mn-cs"/>
-            </a:endParaRPr>
           </a:p>
           <a:p>
             <a:pPr lvl="1"/>
-            <a:r>
-              <a:rPr lang="en-US" kern="1200">
-                <a:solidFill>
-                  <a:schemeClr val="tx1"/>
-                </a:solidFill>
-                <a:latin typeface="+mn-lt"/>
-                <a:ea typeface="+mn-ea"/>
-                <a:cs typeface="+mn-cs"/>
-              </a:rPr>
-              <a:t>Without boosting: </a:t>
-            </a:r>
             <a:r>
               <a:rPr lang="en-US" kern="1200" dirty="0">
                 <a:solidFill>
@@ -7901,19 +7940,11 @@
                 <a:ea typeface="+mn-ea"/>
                 <a:cs typeface="+mn-cs"/>
               </a:rPr>
-              <a:t>µ = </a:t>
-            </a:r>
-            <a:r>
-              <a:rPr lang="en-US" kern="1200">
-                <a:solidFill>
-                  <a:schemeClr val="tx1"/>
-                </a:solidFill>
-                <a:latin typeface="+mn-lt"/>
-                <a:ea typeface="+mn-ea"/>
-                <a:cs typeface="+mn-cs"/>
-              </a:rPr>
-              <a:t>64.1, </a:t>
-            </a:r>
+              <a:t>Without boosting: µ = 64.1, σ = 4</a:t>
+            </a:r>
+          </a:p>
+          <a:p>
+            <a:pPr lvl="1"/>
             <a:r>
               <a:rPr lang="en-US" kern="1200" dirty="0">
                 <a:solidFill>
@@ -7923,41 +7954,8 @@
                 <a:ea typeface="+mn-ea"/>
                 <a:cs typeface="+mn-cs"/>
               </a:rPr>
-              <a:t>σ = </a:t>
-            </a:r>
-            <a:r>
-              <a:rPr lang="en-US" kern="1200">
-                <a:solidFill>
-                  <a:schemeClr val="tx1"/>
-                </a:solidFill>
-                <a:latin typeface="+mn-lt"/>
-                <a:ea typeface="+mn-ea"/>
-                <a:cs typeface="+mn-cs"/>
-              </a:rPr>
-              <a:t>4</a:t>
-            </a:r>
-          </a:p>
-          <a:p>
-            <a:pPr lvl="1"/>
-            <a:r>
-              <a:rPr lang="en-US" kern="1200">
-                <a:solidFill>
-                  <a:schemeClr val="tx1"/>
-                </a:solidFill>
-                <a:latin typeface="+mn-lt"/>
-                <a:ea typeface="+mn-ea"/>
-                <a:cs typeface="+mn-cs"/>
-              </a:rPr>
               <a:t>With boosting: µ = 86.9, σ = 3.07</a:t>
             </a:r>
-            <a:endParaRPr lang="en-US" kern="1200" dirty="0">
-              <a:solidFill>
-                <a:schemeClr val="tx1"/>
-              </a:solidFill>
-              <a:latin typeface="+mn-lt"/>
-              <a:ea typeface="+mn-ea"/>
-              <a:cs typeface="+mn-cs"/>
-            </a:endParaRPr>
           </a:p>
         </p:txBody>
       </p:sp>
@@ -8031,6 +8029,66 @@
           </a:prstGeom>
         </p:spPr>
       </p:pic>
+      <p:sp>
+        <p:nvSpPr>
+          <p:cNvPr id="2" name="Fumetto: rettangolo con angoli arrotondati 1">
+            <a:extLst>
+              <a:ext uri="{FF2B5EF4-FFF2-40B4-BE49-F238E27FC236}">
+                <a16:creationId xmlns:a16="http://schemas.microsoft.com/office/drawing/2014/main" id="{20E06728-F827-4703-A1C9-7E08B5FF0B6A}"/>
+              </a:ext>
+            </a:extLst>
+          </p:cNvPr>
+          <p:cNvSpPr/>
+          <p:nvPr/>
+        </p:nvSpPr>
+        <p:spPr>
+          <a:xfrm>
+            <a:off x="5234731" y="5515288"/>
+            <a:ext cx="2847557" cy="1156678"/>
+          </a:xfrm>
+          <a:prstGeom prst="wedgeRoundRectCallout">
+            <a:avLst>
+              <a:gd name="adj1" fmla="val 34852"/>
+              <a:gd name="adj2" fmla="val -90083"/>
+              <a:gd name="adj3" fmla="val 16667"/>
+            </a:avLst>
+          </a:prstGeom>
+          <a:solidFill>
+            <a:schemeClr val="accent2"/>
+          </a:solidFill>
+        </p:spPr>
+        <p:style>
+          <a:lnRef idx="2">
+            <a:schemeClr val="accent1">
+              <a:shade val="50000"/>
+            </a:schemeClr>
+          </a:lnRef>
+          <a:fillRef idx="1">
+            <a:schemeClr val="accent1"/>
+          </a:fillRef>
+          <a:effectRef idx="0">
+            <a:schemeClr val="accent1"/>
+          </a:effectRef>
+          <a:fontRef idx="minor">
+            <a:schemeClr val="lt1"/>
+          </a:fontRef>
+        </p:style>
+        <p:txBody>
+          <a:bodyPr rtlCol="0" anchor="t"/>
+          <a:lstStyle/>
+          <a:p>
+            <a:pPr algn="ctr"/>
+            <a:r>
+              <a:rPr lang="en-US" sz="1400" dirty="0"/>
+              <a:t>The plots are 2D but actually the dataset has 10 features, so decision boundaries are not visualized well.</a:t>
+            </a:r>
+          </a:p>
+          <a:p>
+            <a:pPr algn="ctr"/>
+            <a:endParaRPr lang="en-US" dirty="0"/>
+          </a:p>
+        </p:txBody>
+      </p:sp>
     </p:spTree>
     <p:extLst>
       <p:ext uri="{BB962C8B-B14F-4D97-AF65-F5344CB8AC3E}">
@@ -8139,37 +8197,114 @@
         <p:spPr/>
         <p:txBody>
           <a:bodyPr vert="horz" lIns="91440" tIns="45720" rIns="91440" bIns="45720" rtlCol="0">
-            <a:normAutofit/>
+            <a:normAutofit fontScale="70000" lnSpcReduction="20000"/>
           </a:bodyPr>
           <a:lstStyle/>
           <a:p>
             <a:r>
               <a:rPr lang="en-US" dirty="0"/>
-              <a:t>Outliers: Naïve Bayes is robust because based on probabilities</a:t>
-            </a:r>
-          </a:p>
-          <a:p>
+              <a:t>Outliers</a:t>
+            </a:r>
+          </a:p>
+          <a:p>
+            <a:pPr lvl="1"/>
             <a:r>
               <a:rPr lang="en-US" dirty="0"/>
-              <a:t>Irrelevant inputs: pruning in DT can ignore irrelevant features</a:t>
-            </a:r>
-          </a:p>
-          <a:p>
+              <a:t>Naïve Bayes is robust (based on probabilities)</a:t>
+            </a:r>
+          </a:p>
+          <a:p>
+            <a:pPr lvl="1"/>
             <a:r>
               <a:rPr lang="en-US" dirty="0"/>
-              <a:t>Predictive power: both, boosting can improve significantly</a:t>
-            </a:r>
-          </a:p>
-          <a:p>
+              <a:t>DT is robust (nodes are determined based on purity indexes of partitions, not single points)</a:t>
+            </a:r>
+          </a:p>
+          <a:p>
+            <a:pPr lvl="1"/>
             <a:r>
               <a:rPr lang="en-US" dirty="0"/>
-              <a:t>Mixed types of data: both</a:t>
+              <a:t>NO boosting (weights corresponding to outliers increase and outliers become more important)</a:t>
             </a:r>
           </a:p>
           <a:p>
             <a:r>
               <a:rPr lang="en-US" dirty="0"/>
-              <a:t>Scalability: boosting can be time consuming depending on T</a:t>
+              <a:t>Irrelevant features</a:t>
+            </a:r>
+          </a:p>
+          <a:p>
+            <a:pPr lvl="1"/>
+            <a:r>
+              <a:rPr lang="en-US" dirty="0"/>
+              <a:t>Naïve Bayes does not ignore them (probabilities of all features are always computed)</a:t>
+            </a:r>
+          </a:p>
+          <a:p>
+            <a:pPr lvl="1"/>
+            <a:r>
+              <a:rPr lang="en-US" dirty="0"/>
+              <a:t>DT can ignore them when pruning (no node uses them)</a:t>
+            </a:r>
+          </a:p>
+          <a:p>
+            <a:r>
+              <a:rPr lang="en-US" dirty="0"/>
+              <a:t>Predictive power</a:t>
+            </a:r>
+          </a:p>
+          <a:p>
+            <a:pPr lvl="1"/>
+            <a:r>
+              <a:rPr lang="en-US" dirty="0"/>
+              <a:t>Naïve Bayes has more expressiveness than DT (DT has decision boundaries parallel to axes)</a:t>
+            </a:r>
+          </a:p>
+          <a:p>
+            <a:pPr lvl="1"/>
+            <a:r>
+              <a:rPr lang="en-US" dirty="0"/>
+              <a:t>Boosting increases expressiveness</a:t>
+            </a:r>
+          </a:p>
+          <a:p>
+            <a:r>
+              <a:rPr lang="en-US" dirty="0"/>
+              <a:t>Mixed types of data</a:t>
+            </a:r>
+          </a:p>
+          <a:p>
+            <a:pPr lvl="1"/>
+            <a:r>
+              <a:rPr lang="en-US" dirty="0"/>
+              <a:t>Naïve Bayes is more expressive for continuous attributes than DT</a:t>
+            </a:r>
+          </a:p>
+          <a:p>
+            <a:pPr lvl="1"/>
+            <a:r>
+              <a:rPr lang="en-US" dirty="0"/>
+              <a:t>Boosting increases accuracy</a:t>
+            </a:r>
+          </a:p>
+          <a:p>
+            <a:r>
+              <a:rPr lang="en-US" dirty="0"/>
+              <a:t>Scalability</a:t>
+            </a:r>
+          </a:p>
+          <a:p>
+            <a:pPr lvl="1"/>
+            <a:r>
+              <a:rPr lang="en-US" dirty="0"/>
+              <a:t>DT is much faster than Naïve Bayes (Naïve Bayes has to compute probabilities)</a:t>
+            </a:r>
+          </a:p>
+          <a:p>
+            <a:pPr lvl="1"/>
+            <a:r>
+              <a:rPr lang="en-US" dirty="0"/>
+              <a:t>Boosting can be time consuming depending on T</a:t>
             </a:r>
             <a:endParaRPr lang="en-US" kern="1200" dirty="0">
               <a:solidFill>
@@ -8789,7 +8924,12 @@
             <p:ph sz="half" idx="1"/>
           </p:nvPr>
         </p:nvSpPr>
-        <p:spPr/>
+        <p:spPr>
+          <a:xfrm>
+            <a:off x="685800" y="2194559"/>
+            <a:ext cx="5334000" cy="4024125"/>
+          </a:xfrm>
+        </p:spPr>
         <p:txBody>
           <a:bodyPr/>
           <a:lstStyle/>

</xml_diff>

<commit_message>
delete tmp files and add presentation as pdf
</commit_message>
<xml_diff>
--- a/Lab 3/Lab 3 - presentation.pptx
+++ b/Lab 3/Lab 3 - presentation.pptx
@@ -137,7 +137,7 @@
 <file path=ppt/revisionInfo.xml><?xml version="1.0" encoding="utf-8"?>
 <p1510:revInfo xmlns:a="http://schemas.openxmlformats.org/drawingml/2006/main" xmlns:r="http://schemas.openxmlformats.org/officeDocument/2006/relationships" xmlns:p1510="http://schemas.microsoft.com/office/powerpoint/2015/10/main">
   <p1510:revLst>
-    <p1510:client id="{D8044BFB-ECB7-4860-8B53-8AB623343355}" v="178" dt="2019-10-23T16:32:08.887"/>
+    <p1510:client id="{D8044BFB-ECB7-4860-8B53-8AB623343355}" v="180" dt="2019-10-23T16:49:17.173"/>
   </p1510:revLst>
 </p1510:revInfo>
 </file>
@@ -147,7 +147,7 @@
   <pc:docChgLst>
     <pc:chgData name="Franco Ruggeri" userId="f8fb41c0b3afb4f0" providerId="LiveId" clId="{D8044BFB-ECB7-4860-8B53-8AB623343355}"/>
     <pc:docChg chg="undo custSel mod addSld delSld modSld sldOrd">
-      <pc:chgData name="Franco Ruggeri" userId="f8fb41c0b3afb4f0" providerId="LiveId" clId="{D8044BFB-ECB7-4860-8B53-8AB623343355}" dt="2019-10-23T16:32:29.596" v="4931" actId="1076"/>
+      <pc:chgData name="Franco Ruggeri" userId="f8fb41c0b3afb4f0" providerId="LiveId" clId="{D8044BFB-ECB7-4860-8B53-8AB623343355}" dt="2019-10-23T16:49:19.387" v="4937" actId="20577"/>
       <pc:docMkLst>
         <pc:docMk/>
       </pc:docMkLst>
@@ -796,13 +796,13 @@
         </pc:spChg>
       </pc:sldChg>
       <pc:sldChg chg="addSp delSp modSp add mod setBg">
-        <pc:chgData name="Franco Ruggeri" userId="f8fb41c0b3afb4f0" providerId="LiveId" clId="{D8044BFB-ECB7-4860-8B53-8AB623343355}" dt="2019-10-23T00:44:48.232" v="2783" actId="20577"/>
+        <pc:chgData name="Franco Ruggeri" userId="f8fb41c0b3afb4f0" providerId="LiveId" clId="{D8044BFB-ECB7-4860-8B53-8AB623343355}" dt="2019-10-23T16:49:17.173" v="4935"/>
         <pc:sldMkLst>
           <pc:docMk/>
           <pc:sldMk cId="568158431" sldId="280"/>
         </pc:sldMkLst>
         <pc:spChg chg="mod">
-          <ac:chgData name="Franco Ruggeri" userId="f8fb41c0b3afb4f0" providerId="LiveId" clId="{D8044BFB-ECB7-4860-8B53-8AB623343355}" dt="2019-10-23T00:44:11.081" v="2782"/>
+          <ac:chgData name="Franco Ruggeri" userId="f8fb41c0b3afb4f0" providerId="LiveId" clId="{D8044BFB-ECB7-4860-8B53-8AB623343355}" dt="2019-10-23T16:49:17.173" v="4935"/>
           <ac:spMkLst>
             <pc:docMk/>
             <pc:sldMk cId="568158431" sldId="280"/>
@@ -1068,7 +1068,7 @@
         </pc:picChg>
       </pc:sldChg>
       <pc:sldChg chg="addSp delSp modSp add mod setBg delDesignElem">
-        <pc:chgData name="Franco Ruggeri" userId="f8fb41c0b3afb4f0" providerId="LiveId" clId="{D8044BFB-ECB7-4860-8B53-8AB623343355}" dt="2019-10-23T16:32:29.596" v="4931" actId="1076"/>
+        <pc:chgData name="Franco Ruggeri" userId="f8fb41c0b3afb4f0" providerId="LiveId" clId="{D8044BFB-ECB7-4860-8B53-8AB623343355}" dt="2019-10-23T16:49:19.387" v="4937" actId="20577"/>
         <pc:sldMkLst>
           <pc:docMk/>
           <pc:sldMk cId="3402406186" sldId="286"/>
@@ -1082,7 +1082,7 @@
           </ac:spMkLst>
         </pc:spChg>
         <pc:spChg chg="mod">
-          <ac:chgData name="Franco Ruggeri" userId="f8fb41c0b3afb4f0" providerId="LiveId" clId="{D8044BFB-ECB7-4860-8B53-8AB623343355}" dt="2019-10-23T00:46:37.123" v="2791" actId="26606"/>
+          <ac:chgData name="Franco Ruggeri" userId="f8fb41c0b3afb4f0" providerId="LiveId" clId="{D8044BFB-ECB7-4860-8B53-8AB623343355}" dt="2019-10-23T16:49:19.387" v="4937" actId="20577"/>
           <ac:spMkLst>
             <pc:docMk/>
             <pc:sldMk cId="3402406186" sldId="286"/>
@@ -7881,30 +7881,24 @@
           <a:p>
             <a:pPr lvl="1"/>
             <a:r>
-              <a:rPr lang="en-US" kern="1200" dirty="0">
-                <a:solidFill>
-                  <a:schemeClr val="tx1"/>
-                </a:solidFill>
-                <a:latin typeface="+mn-lt"/>
-                <a:ea typeface="+mn-ea"/>
-                <a:cs typeface="+mn-cs"/>
-              </a:rPr>
-              <a:t>2 correlated features</a:t>
+              <a:rPr lang="en-US" dirty="0"/>
+              <a:t>10 correlated features</a:t>
             </a:r>
           </a:p>
           <a:p>
             <a:pPr lvl="1"/>
             <a:r>
-              <a:rPr lang="en-US" kern="1200" dirty="0">
-                <a:solidFill>
-                  <a:schemeClr val="tx1"/>
-                </a:solidFill>
-                <a:latin typeface="+mn-lt"/>
-                <a:ea typeface="+mn-ea"/>
-                <a:cs typeface="+mn-cs"/>
-              </a:rPr>
-              <a:t>3 classes</a:t>
-            </a:r>
+              <a:rPr lang="en-US"/>
+              <a:t>11 classes</a:t>
+            </a:r>
+            <a:endParaRPr lang="en-US" kern="1200" dirty="0">
+              <a:solidFill>
+                <a:schemeClr val="tx1"/>
+              </a:solidFill>
+              <a:latin typeface="+mn-lt"/>
+              <a:ea typeface="+mn-ea"/>
+              <a:cs typeface="+mn-cs"/>
+            </a:endParaRPr>
           </a:p>
           <a:p>
             <a:endParaRPr lang="en-US" kern="1200" dirty="0">
@@ -10091,14 +10085,14 @@
             <a:pPr lvl="1"/>
             <a:r>
               <a:rPr lang="en-US" dirty="0"/>
-              <a:t>10 correlated features</a:t>
+              <a:t>2 correlated features</a:t>
             </a:r>
           </a:p>
           <a:p>
             <a:pPr lvl="1"/>
             <a:r>
               <a:rPr lang="en-US" dirty="0"/>
-              <a:t>11 classes</a:t>
+              <a:t>3 classes</a:t>
             </a:r>
           </a:p>
           <a:p>

</xml_diff>

<commit_message>
fix presentation lab 3
</commit_message>
<xml_diff>
--- a/Lab 3/Lab 3 - presentation.pptx
+++ b/Lab 3/Lab 3 - presentation.pptx
@@ -13,8 +13,8 @@
     <p:sldId id="279" r:id="rId7"/>
     <p:sldId id="283" r:id="rId8"/>
     <p:sldId id="277" r:id="rId9"/>
-    <p:sldId id="280" r:id="rId10"/>
-    <p:sldId id="286" r:id="rId11"/>
+    <p:sldId id="288" r:id="rId10"/>
+    <p:sldId id="280" r:id="rId11"/>
     <p:sldId id="287" r:id="rId12"/>
   </p:sldIdLst>
   <p:sldSz cx="12192000" cy="6858000"/>
@@ -145,6 +145,15 @@
 <file path=ppt/changesInfos/changesInfo1.xml><?xml version="1.0" encoding="utf-8"?>
 <pc:chgInfo xmlns:a="http://schemas.openxmlformats.org/drawingml/2006/main" xmlns:r="http://schemas.openxmlformats.org/officeDocument/2006/relationships" xmlns:ac="http://schemas.microsoft.com/office/drawing/2013/main/command" xmlns:pc="http://schemas.microsoft.com/office/powerpoint/2013/main/command">
   <pc:docChgLst>
+    <pc:chgData name="Alessandro Iucci" userId="84c7e91a124b25e9" providerId="LiveId" clId="{955445CC-B49E-44CD-B4CB-5BAC92870AA8}"/>
+    <pc:docChg chg="custSel mod addSld modSld">
+      <pc:chgData name="Alessandro Iucci" userId="84c7e91a124b25e9" providerId="LiveId" clId="{955445CC-B49E-44CD-B4CB-5BAC92870AA8}" dt="2019-10-09T10:10:47.873" v="711" actId="20577"/>
+      <pc:docMkLst>
+        <pc:docMk/>
+      </pc:docMkLst>
+    </pc:docChg>
+  </pc:docChgLst>
+  <pc:docChgLst>
     <pc:chgData name="Franco Ruggeri" userId="f8fb41c0b3afb4f0" providerId="LiveId" clId="{D8044BFB-ECB7-4860-8B53-8AB623343355}"/>
     <pc:docChg chg="undo custSel mod addSld delSld modSld sldOrd">
       <pc:chgData name="Franco Ruggeri" userId="f8fb41c0b3afb4f0" providerId="LiveId" clId="{D8044BFB-ECB7-4860-8B53-8AB623343355}" dt="2019-10-23T16:49:19.387" v="4937" actId="20577"/>
@@ -1717,15 +1726,6 @@
     <pc:chgData name="Franco Ruggeri" userId="f8fb41c0b3afb4f0" providerId="LiveId" clId="{91284456-B732-4D55-8327-55814796A3F8}"/>
     <pc:docChg chg="custSel modSld">
       <pc:chgData name="Franco Ruggeri" userId="f8fb41c0b3afb4f0" providerId="LiveId" clId="{91284456-B732-4D55-8327-55814796A3F8}" dt="2019-10-10T12:20:35.321" v="1" actId="1076"/>
-      <pc:docMkLst>
-        <pc:docMk/>
-      </pc:docMkLst>
-    </pc:docChg>
-  </pc:docChgLst>
-  <pc:docChgLst>
-    <pc:chgData name="Alessandro Iucci" userId="84c7e91a124b25e9" providerId="LiveId" clId="{955445CC-B49E-44CD-B4CB-5BAC92870AA8}"/>
-    <pc:docChg chg="custSel mod addSld modSld">
-      <pc:chgData name="Alessandro Iucci" userId="84c7e91a124b25e9" providerId="LiveId" clId="{955445CC-B49E-44CD-B4CB-5BAC92870AA8}" dt="2019-10-09T10:10:47.873" v="711" actId="20577"/>
       <pc:docMkLst>
         <pc:docMk/>
       </pc:docMkLst>
@@ -1918,7 +1918,7 @@
           <a:p>
             <a:fld id="{B68DAA86-DE6B-4FFE-8B9F-AB26AC49B716}" type="datetimeFigureOut">
               <a:rPr lang="en-GB" smtClean="0"/>
-              <a:t>23/10/2019</a:t>
+              <a:t>07/05/2020</a:t>
             </a:fld>
             <a:endParaRPr lang="en-GB" dirty="0"/>
           </a:p>
@@ -1970,7 +1970,7 @@
           <a:p>
             <a:fld id="{3F2C29EC-BF13-463C-A228-A8B1DC07216B}" type="slidenum">
               <a:rPr lang="en-GB" smtClean="0"/>
-              <a:t>‹N›</a:t>
+              <a:t>‹#›</a:t>
             </a:fld>
             <a:endParaRPr lang="en-GB" dirty="0"/>
           </a:p>
@@ -2185,7 +2185,7 @@
           <a:p>
             <a:fld id="{B68DAA86-DE6B-4FFE-8B9F-AB26AC49B716}" type="datetimeFigureOut">
               <a:rPr lang="en-GB" smtClean="0"/>
-              <a:t>23/10/2019</a:t>
+              <a:t>07/05/2020</a:t>
             </a:fld>
             <a:endParaRPr lang="en-GB" dirty="0"/>
           </a:p>
@@ -2227,7 +2227,7 @@
           <a:p>
             <a:fld id="{3F2C29EC-BF13-463C-A228-A8B1DC07216B}" type="slidenum">
               <a:rPr lang="en-GB" smtClean="0"/>
-              <a:t>‹N›</a:t>
+              <a:t>‹#›</a:t>
             </a:fld>
             <a:endParaRPr lang="en-GB" dirty="0"/>
           </a:p>
@@ -2416,7 +2416,7 @@
           <a:p>
             <a:fld id="{B68DAA86-DE6B-4FFE-8B9F-AB26AC49B716}" type="datetimeFigureOut">
               <a:rPr lang="en-GB" smtClean="0"/>
-              <a:t>23/10/2019</a:t>
+              <a:t>07/05/2020</a:t>
             </a:fld>
             <a:endParaRPr lang="en-GB" dirty="0"/>
           </a:p>
@@ -2468,7 +2468,7 @@
           <a:p>
             <a:fld id="{3F2C29EC-BF13-463C-A228-A8B1DC07216B}" type="slidenum">
               <a:rPr lang="en-GB" smtClean="0"/>
-              <a:t>‹N›</a:t>
+              <a:t>‹#›</a:t>
             </a:fld>
             <a:endParaRPr lang="en-GB" dirty="0"/>
           </a:p>
@@ -2726,7 +2726,7 @@
           <a:p>
             <a:fld id="{B68DAA86-DE6B-4FFE-8B9F-AB26AC49B716}" type="datetimeFigureOut">
               <a:rPr lang="en-GB" smtClean="0"/>
-              <a:t>23/10/2019</a:t>
+              <a:t>07/05/2020</a:t>
             </a:fld>
             <a:endParaRPr lang="en-GB" dirty="0"/>
           </a:p>
@@ -2778,7 +2778,7 @@
           <a:p>
             <a:fld id="{3F2C29EC-BF13-463C-A228-A8B1DC07216B}" type="slidenum">
               <a:rPr lang="en-GB" smtClean="0"/>
-              <a:t>‹N›</a:t>
+              <a:t>‹#›</a:t>
             </a:fld>
             <a:endParaRPr lang="en-GB" dirty="0"/>
           </a:p>
@@ -3199,7 +3199,7 @@
           <a:p>
             <a:fld id="{B68DAA86-DE6B-4FFE-8B9F-AB26AC49B716}" type="datetimeFigureOut">
               <a:rPr lang="en-GB" smtClean="0"/>
-              <a:t>23/10/2019</a:t>
+              <a:t>07/05/2020</a:t>
             </a:fld>
             <a:endParaRPr lang="en-GB" dirty="0"/>
           </a:p>
@@ -3251,7 +3251,7 @@
           <a:p>
             <a:fld id="{3F2C29EC-BF13-463C-A228-A8B1DC07216B}" type="slidenum">
               <a:rPr lang="en-GB" smtClean="0"/>
-              <a:t>‹N›</a:t>
+              <a:t>‹#›</a:t>
             </a:fld>
             <a:endParaRPr lang="en-GB" dirty="0"/>
           </a:p>
@@ -3746,7 +3746,7 @@
           <a:p>
             <a:fld id="{B68DAA86-DE6B-4FFE-8B9F-AB26AC49B716}" type="datetimeFigureOut">
               <a:rPr lang="en-GB" smtClean="0"/>
-              <a:t>23/10/2019</a:t>
+              <a:t>07/05/2020</a:t>
             </a:fld>
             <a:endParaRPr lang="en-GB" dirty="0"/>
           </a:p>
@@ -3788,7 +3788,7 @@
           <a:p>
             <a:fld id="{3F2C29EC-BF13-463C-A228-A8B1DC07216B}" type="slidenum">
               <a:rPr lang="en-GB" smtClean="0"/>
-              <a:t>‹N›</a:t>
+              <a:t>‹#›</a:t>
             </a:fld>
             <a:endParaRPr lang="en-GB" dirty="0"/>
           </a:p>
@@ -4520,7 +4520,7 @@
           <a:p>
             <a:fld id="{B68DAA86-DE6B-4FFE-8B9F-AB26AC49B716}" type="datetimeFigureOut">
               <a:rPr lang="en-GB" smtClean="0"/>
-              <a:t>23/10/2019</a:t>
+              <a:t>07/05/2020</a:t>
             </a:fld>
             <a:endParaRPr lang="en-GB" dirty="0"/>
           </a:p>
@@ -4562,7 +4562,7 @@
           <a:p>
             <a:fld id="{3F2C29EC-BF13-463C-A228-A8B1DC07216B}" type="slidenum">
               <a:rPr lang="en-GB" smtClean="0"/>
-              <a:t>‹N›</a:t>
+              <a:t>‹#›</a:t>
             </a:fld>
             <a:endParaRPr lang="en-GB" dirty="0"/>
           </a:p>
@@ -4695,7 +4695,7 @@
           <a:p>
             <a:fld id="{B68DAA86-DE6B-4FFE-8B9F-AB26AC49B716}" type="datetimeFigureOut">
               <a:rPr lang="en-GB" smtClean="0"/>
-              <a:t>23/10/2019</a:t>
+              <a:t>07/05/2020</a:t>
             </a:fld>
             <a:endParaRPr lang="en-GB" dirty="0"/>
           </a:p>
@@ -4737,7 +4737,7 @@
           <a:p>
             <a:fld id="{3F2C29EC-BF13-463C-A228-A8B1DC07216B}" type="slidenum">
               <a:rPr lang="en-GB" smtClean="0"/>
-              <a:t>‹N›</a:t>
+              <a:t>‹#›</a:t>
             </a:fld>
             <a:endParaRPr lang="en-GB" dirty="0"/>
           </a:p>
@@ -4918,7 +4918,7 @@
           <a:p>
             <a:fld id="{B68DAA86-DE6B-4FFE-8B9F-AB26AC49B716}" type="datetimeFigureOut">
               <a:rPr lang="en-GB" smtClean="0"/>
-              <a:t>23/10/2019</a:t>
+              <a:t>07/05/2020</a:t>
             </a:fld>
             <a:endParaRPr lang="en-GB" dirty="0"/>
           </a:p>
@@ -4970,7 +4970,7 @@
           <a:p>
             <a:fld id="{3F2C29EC-BF13-463C-A228-A8B1DC07216B}" type="slidenum">
               <a:rPr lang="en-GB" smtClean="0"/>
-              <a:t>‹N›</a:t>
+              <a:t>‹#›</a:t>
             </a:fld>
             <a:endParaRPr lang="en-GB" dirty="0"/>
           </a:p>
@@ -5098,7 +5098,7 @@
           <a:p>
             <a:fld id="{B68DAA86-DE6B-4FFE-8B9F-AB26AC49B716}" type="datetimeFigureOut">
               <a:rPr lang="en-GB" smtClean="0"/>
-              <a:t>23/10/2019</a:t>
+              <a:t>07/05/2020</a:t>
             </a:fld>
             <a:endParaRPr lang="en-GB" dirty="0"/>
           </a:p>
@@ -5140,7 +5140,7 @@
           <a:p>
             <a:fld id="{3F2C29EC-BF13-463C-A228-A8B1DC07216B}" type="slidenum">
               <a:rPr lang="en-GB" smtClean="0"/>
-              <a:t>‹N›</a:t>
+              <a:t>‹#›</a:t>
             </a:fld>
             <a:endParaRPr lang="en-GB" dirty="0"/>
           </a:p>
@@ -5387,7 +5387,7 @@
           <a:p>
             <a:fld id="{B68DAA86-DE6B-4FFE-8B9F-AB26AC49B716}" type="datetimeFigureOut">
               <a:rPr lang="en-GB" smtClean="0"/>
-              <a:t>23/10/2019</a:t>
+              <a:t>07/05/2020</a:t>
             </a:fld>
             <a:endParaRPr lang="en-GB" dirty="0"/>
           </a:p>
@@ -5439,7 +5439,7 @@
           <a:p>
             <a:fld id="{3F2C29EC-BF13-463C-A228-A8B1DC07216B}" type="slidenum">
               <a:rPr lang="en-GB" smtClean="0"/>
-              <a:t>‹N›</a:t>
+              <a:t>‹#›</a:t>
             </a:fld>
             <a:endParaRPr lang="en-GB" dirty="0"/>
           </a:p>
@@ -5629,7 +5629,7 @@
           <a:p>
             <a:fld id="{B68DAA86-DE6B-4FFE-8B9F-AB26AC49B716}" type="datetimeFigureOut">
               <a:rPr lang="en-GB" smtClean="0"/>
-              <a:t>23/10/2019</a:t>
+              <a:t>07/05/2020</a:t>
             </a:fld>
             <a:endParaRPr lang="en-GB" dirty="0"/>
           </a:p>
@@ -5671,7 +5671,7 @@
           <a:p>
             <a:fld id="{3F2C29EC-BF13-463C-A228-A8B1DC07216B}" type="slidenum">
               <a:rPr lang="en-GB" smtClean="0"/>
-              <a:t>‹N›</a:t>
+              <a:t>‹#›</a:t>
             </a:fld>
             <a:endParaRPr lang="en-GB" dirty="0"/>
           </a:p>
@@ -6008,7 +6008,7 @@
           <a:p>
             <a:fld id="{B68DAA86-DE6B-4FFE-8B9F-AB26AC49B716}" type="datetimeFigureOut">
               <a:rPr lang="en-GB" smtClean="0"/>
-              <a:t>23/10/2019</a:t>
+              <a:t>07/05/2020</a:t>
             </a:fld>
             <a:endParaRPr lang="en-GB" dirty="0"/>
           </a:p>
@@ -6050,7 +6050,7 @@
           <a:p>
             <a:fld id="{3F2C29EC-BF13-463C-A228-A8B1DC07216B}" type="slidenum">
               <a:rPr lang="en-GB" smtClean="0"/>
-              <a:t>‹N›</a:t>
+              <a:t>‹#›</a:t>
             </a:fld>
             <a:endParaRPr lang="en-GB" dirty="0"/>
           </a:p>
@@ -6126,7 +6126,7 @@
           <a:p>
             <a:fld id="{B68DAA86-DE6B-4FFE-8B9F-AB26AC49B716}" type="datetimeFigureOut">
               <a:rPr lang="en-GB" smtClean="0"/>
-              <a:t>23/10/2019</a:t>
+              <a:t>07/05/2020</a:t>
             </a:fld>
             <a:endParaRPr lang="en-GB" dirty="0"/>
           </a:p>
@@ -6168,7 +6168,7 @@
           <a:p>
             <a:fld id="{3F2C29EC-BF13-463C-A228-A8B1DC07216B}" type="slidenum">
               <a:rPr lang="en-GB" smtClean="0"/>
-              <a:t>‹N›</a:t>
+              <a:t>‹#›</a:t>
             </a:fld>
             <a:endParaRPr lang="en-GB" dirty="0"/>
           </a:p>
@@ -6221,7 +6221,7 @@
           <a:p>
             <a:fld id="{B68DAA86-DE6B-4FFE-8B9F-AB26AC49B716}" type="datetimeFigureOut">
               <a:rPr lang="en-GB" smtClean="0"/>
-              <a:t>23/10/2019</a:t>
+              <a:t>07/05/2020</a:t>
             </a:fld>
             <a:endParaRPr lang="en-GB" dirty="0"/>
           </a:p>
@@ -6263,7 +6263,7 @@
           <a:p>
             <a:fld id="{3F2C29EC-BF13-463C-A228-A8B1DC07216B}" type="slidenum">
               <a:rPr lang="en-GB" smtClean="0"/>
-              <a:t>‹N›</a:t>
+              <a:t>‹#›</a:t>
             </a:fld>
             <a:endParaRPr lang="en-GB" dirty="0"/>
           </a:p>
@@ -6470,7 +6470,7 @@
           <a:p>
             <a:fld id="{B68DAA86-DE6B-4FFE-8B9F-AB26AC49B716}" type="datetimeFigureOut">
               <a:rPr lang="en-GB" smtClean="0"/>
-              <a:t>23/10/2019</a:t>
+              <a:t>07/05/2020</a:t>
             </a:fld>
             <a:endParaRPr lang="en-GB" dirty="0"/>
           </a:p>
@@ -6512,7 +6512,7 @@
           <a:p>
             <a:fld id="{3F2C29EC-BF13-463C-A228-A8B1DC07216B}" type="slidenum">
               <a:rPr lang="en-GB" smtClean="0"/>
-              <a:t>‹N›</a:t>
+              <a:t>‹#›</a:t>
             </a:fld>
             <a:endParaRPr lang="en-GB" dirty="0"/>
           </a:p>
@@ -6727,7 +6727,7 @@
           <a:p>
             <a:fld id="{B68DAA86-DE6B-4FFE-8B9F-AB26AC49B716}" type="datetimeFigureOut">
               <a:rPr lang="en-GB" smtClean="0"/>
-              <a:t>23/10/2019</a:t>
+              <a:t>07/05/2020</a:t>
             </a:fld>
             <a:endParaRPr lang="en-GB" dirty="0"/>
           </a:p>
@@ -6769,7 +6769,7 @@
           <a:p>
             <a:fld id="{3F2C29EC-BF13-463C-A228-A8B1DC07216B}" type="slidenum">
               <a:rPr lang="en-GB" smtClean="0"/>
-              <a:t>‹N›</a:t>
+              <a:t>‹#›</a:t>
             </a:fld>
             <a:endParaRPr lang="en-GB" dirty="0"/>
           </a:p>
@@ -6970,7 +6970,7 @@
           <a:p>
             <a:fld id="{B68DAA86-DE6B-4FFE-8B9F-AB26AC49B716}" type="datetimeFigureOut">
               <a:rPr lang="en-GB" smtClean="0"/>
-              <a:t>23/10/2019</a:t>
+              <a:t>07/05/2020</a:t>
             </a:fld>
             <a:endParaRPr lang="en-GB" dirty="0"/>
           </a:p>
@@ -7048,7 +7048,7 @@
           <a:p>
             <a:fld id="{3F2C29EC-BF13-463C-A228-A8B1DC07216B}" type="slidenum">
               <a:rPr lang="en-GB" smtClean="0"/>
-              <a:t>‹N›</a:t>
+              <a:t>‹#›</a:t>
             </a:fld>
             <a:endParaRPr lang="en-GB" dirty="0"/>
           </a:p>
@@ -7753,7 +7753,7 @@
       </p:grpSpPr>
       <p:pic>
         <p:nvPicPr>
-          <p:cNvPr id="27" name="Picture 29">
+          <p:cNvPr id="33" name="Picture 24">
             <a:extLst>
               <a:ext uri="{FF2B5EF4-FFF2-40B4-BE49-F238E27FC236}">
                 <a16:creationId xmlns:a16="http://schemas.microsoft.com/office/drawing/2014/main" id="{EE253802-2FE2-4F1F-B256-423BEF09FB90}"/>
@@ -7875,30 +7875,22 @@
                 <a:ea typeface="+mn-ea"/>
                 <a:cs typeface="+mn-cs"/>
               </a:rPr>
-              <a:t>Vowel dataset</a:t>
+              <a:t>Iris dataset</a:t>
             </a:r>
           </a:p>
           <a:p>
             <a:pPr lvl="1"/>
             <a:r>
               <a:rPr lang="en-US" dirty="0"/>
-              <a:t>10 correlated features</a:t>
+              <a:t>2 correlated features</a:t>
             </a:r>
           </a:p>
           <a:p>
             <a:pPr lvl="1"/>
             <a:r>
-              <a:rPr lang="en-US"/>
-              <a:t>11 classes</a:t>
-            </a:r>
-            <a:endParaRPr lang="en-US" kern="1200" dirty="0">
-              <a:solidFill>
-                <a:schemeClr val="tx1"/>
-              </a:solidFill>
-              <a:latin typeface="+mn-lt"/>
-              <a:ea typeface="+mn-ea"/>
-              <a:cs typeface="+mn-cs"/>
-            </a:endParaRPr>
+              <a:rPr lang="en-US" dirty="0"/>
+              <a:t>3 classes</a:t>
+            </a:r>
           </a:p>
           <a:p>
             <a:endParaRPr lang="en-US" kern="1200" dirty="0">
@@ -7922,9 +7914,14 @@
               </a:rPr>
               <a:t>Accuracy</a:t>
             </a:r>
+            <a:endParaRPr lang="en-US" dirty="0"/>
           </a:p>
           <a:p>
             <a:pPr lvl="1"/>
+            <a:r>
+              <a:rPr lang="en-US" dirty="0"/>
+              <a:t>Without boosting: </a:t>
+            </a:r>
             <a:r>
               <a:rPr lang="en-US" kern="1200" dirty="0">
                 <a:solidFill>
@@ -7934,7 +7931,7 @@
                 <a:ea typeface="+mn-ea"/>
                 <a:cs typeface="+mn-cs"/>
               </a:rPr>
-              <a:t>Without boosting: µ = 64.1, σ = 4</a:t>
+              <a:t>µ = 92.4, σ = 3.71</a:t>
             </a:r>
           </a:p>
           <a:p>
@@ -7948,24 +7945,38 @@
                 <a:ea typeface="+mn-ea"/>
                 <a:cs typeface="+mn-cs"/>
               </a:rPr>
-              <a:t>With boosting: µ = 86.9, σ = 3.07</a:t>
-            </a:r>
+              <a:t>With </a:t>
+            </a:r>
+            <a:r>
+              <a:rPr lang="en-US" dirty="0"/>
+              <a:t>boosting: µ = 94.6, σ = 3.65</a:t>
+            </a:r>
+            <a:endParaRPr lang="en-US" kern="1200" dirty="0">
+              <a:solidFill>
+                <a:schemeClr val="tx1"/>
+              </a:solidFill>
+              <a:latin typeface="+mn-lt"/>
+              <a:ea typeface="+mn-ea"/>
+              <a:cs typeface="+mn-cs"/>
+            </a:endParaRPr>
           </a:p>
         </p:txBody>
       </p:sp>
       <p:pic>
         <p:nvPicPr>
-          <p:cNvPr id="14" name="Immagine 13">
+          <p:cNvPr id="6" name="Segnaposto contenuto 5">
             <a:extLst>
               <a:ext uri="{FF2B5EF4-FFF2-40B4-BE49-F238E27FC236}">
-                <a16:creationId xmlns:a16="http://schemas.microsoft.com/office/drawing/2014/main" id="{02F131B3-ABC1-4796-8A32-3E38543C2061}"/>
+                <a16:creationId xmlns:a16="http://schemas.microsoft.com/office/drawing/2014/main" id="{344B735E-4B68-42C5-B621-CAFA8512334C}"/>
               </a:ext>
             </a:extLst>
           </p:cNvPr>
           <p:cNvPicPr>
-            <a:picLocks noChangeAspect="1"/>
+            <a:picLocks noGrp="1" noChangeAspect="1"/>
           </p:cNvPicPr>
-          <p:nvPr/>
+          <p:nvPr>
+            <p:ph sz="half" idx="2"/>
+          </p:nvPr>
         </p:nvPicPr>
         <p:blipFill rotWithShape="1">
           <a:blip r:embed="rId3">
@@ -7975,7 +7986,7 @@
               </a:ext>
             </a:extLst>
           </a:blip>
-          <a:srcRect t="5023" r="-4" b="8006"/>
+          <a:srcRect r="-4" b="13029"/>
           <a:stretch/>
         </p:blipFill>
         <p:spPr>
@@ -7990,10 +8001,10 @@
       </p:pic>
       <p:pic>
         <p:nvPicPr>
-          <p:cNvPr id="12" name="Immagine 11">
+          <p:cNvPr id="4" name="Immagine 3">
             <a:extLst>
               <a:ext uri="{FF2B5EF4-FFF2-40B4-BE49-F238E27FC236}">
-                <a16:creationId xmlns:a16="http://schemas.microsoft.com/office/drawing/2014/main" id="{A80E2C67-DAE8-4DBD-9952-B9D618F0D7D3}"/>
+                <a16:creationId xmlns:a16="http://schemas.microsoft.com/office/drawing/2014/main" id="{F0C0799D-613F-4AA4-997E-D14E4F4E1EBC}"/>
               </a:ext>
             </a:extLst>
           </p:cNvPr>
@@ -8010,7 +8021,7 @@
               </a:ext>
             </a:extLst>
           </a:blip>
-          <a:srcRect t="4879" r="-4" b="8150"/>
+          <a:srcRect r="-4" b="13029"/>
           <a:stretch/>
         </p:blipFill>
         <p:spPr>
@@ -8023,70 +8034,10 @@
           </a:prstGeom>
         </p:spPr>
       </p:pic>
-      <p:sp>
-        <p:nvSpPr>
-          <p:cNvPr id="2" name="Fumetto: rettangolo con angoli arrotondati 1">
-            <a:extLst>
-              <a:ext uri="{FF2B5EF4-FFF2-40B4-BE49-F238E27FC236}">
-                <a16:creationId xmlns:a16="http://schemas.microsoft.com/office/drawing/2014/main" id="{20E06728-F827-4703-A1C9-7E08B5FF0B6A}"/>
-              </a:ext>
-            </a:extLst>
-          </p:cNvPr>
-          <p:cNvSpPr/>
-          <p:nvPr/>
-        </p:nvSpPr>
-        <p:spPr>
-          <a:xfrm>
-            <a:off x="5234731" y="5515288"/>
-            <a:ext cx="2847557" cy="1156678"/>
-          </a:xfrm>
-          <a:prstGeom prst="wedgeRoundRectCallout">
-            <a:avLst>
-              <a:gd name="adj1" fmla="val 34852"/>
-              <a:gd name="adj2" fmla="val -90083"/>
-              <a:gd name="adj3" fmla="val 16667"/>
-            </a:avLst>
-          </a:prstGeom>
-          <a:solidFill>
-            <a:schemeClr val="accent2"/>
-          </a:solidFill>
-        </p:spPr>
-        <p:style>
-          <a:lnRef idx="2">
-            <a:schemeClr val="accent1">
-              <a:shade val="50000"/>
-            </a:schemeClr>
-          </a:lnRef>
-          <a:fillRef idx="1">
-            <a:schemeClr val="accent1"/>
-          </a:fillRef>
-          <a:effectRef idx="0">
-            <a:schemeClr val="accent1"/>
-          </a:effectRef>
-          <a:fontRef idx="minor">
-            <a:schemeClr val="lt1"/>
-          </a:fontRef>
-        </p:style>
-        <p:txBody>
-          <a:bodyPr rtlCol="0" anchor="t"/>
-          <a:lstStyle/>
-          <a:p>
-            <a:pPr algn="ctr"/>
-            <a:r>
-              <a:rPr lang="en-US" sz="1400" dirty="0"/>
-              <a:t>The plots are 2D but actually the dataset has 10 features, so decision boundaries are not visualized well.</a:t>
-            </a:r>
-          </a:p>
-          <a:p>
-            <a:pPr algn="ctr"/>
-            <a:endParaRPr lang="en-US" dirty="0"/>
-          </a:p>
-        </p:txBody>
-      </p:sp>
     </p:spTree>
     <p:extLst>
       <p:ext uri="{BB962C8B-B14F-4D97-AF65-F5344CB8AC3E}">
-        <p14:creationId xmlns:p14="http://schemas.microsoft.com/office/powerpoint/2010/main" val="3402406186"/>
+        <p14:creationId xmlns:p14="http://schemas.microsoft.com/office/powerpoint/2010/main" val="568158431"/>
       </p:ext>
     </p:extLst>
   </p:cSld>
@@ -8377,8 +8328,8 @@
           </a:p>
         </p:txBody>
       </p:sp>
-      <mc:AlternateContent xmlns:mc="http://schemas.openxmlformats.org/markup-compatibility/2006" xmlns:a14="http://schemas.microsoft.com/office/drawing/2010/main">
-        <mc:Choice Requires="a14">
+      <mc:AlternateContent xmlns:mc="http://schemas.openxmlformats.org/markup-compatibility/2006">
+        <mc:Choice xmlns:a14="http://schemas.microsoft.com/office/drawing/2010/main" Requires="a14">
           <p:sp>
             <p:nvSpPr>
               <p:cNvPr id="3" name="Segnaposto contenuto 2">
@@ -8578,7 +8529,7 @@
                 <a:pPr lvl="1"/>
                 <a:r>
                   <a:rPr lang="en-US" dirty="0"/>
-                  <a:t>Learn D one-dimensional distributions instead of one D-dimensional distribution</a:t>
+                  <a:t>Learn D one-dimensional distributions instead of one D-dimensional distribution (good when little data is available)</a:t>
                 </a:r>
               </a:p>
               <a:p>
@@ -8608,7 +8559,7 @@
             </p:txBody>
           </p:sp>
         </mc:Choice>
-        <mc:Fallback xmlns="">
+        <mc:Fallback>
           <p:sp>
             <p:nvSpPr>
               <p:cNvPr id="3" name="Segnaposto contenuto 2">
@@ -8744,7 +8695,15 @@
             <a:pPr lvl="1"/>
             <a:r>
               <a:rPr lang="en-US" dirty="0"/>
-              <a:t>2 correlated features</a:t>
+              <a:t>2 </a:t>
+            </a:r>
+            <a:r>
+              <a:rPr lang="en-US" b="1" dirty="0"/>
+              <a:t>correlated</a:t>
+            </a:r>
+            <a:r>
+              <a:rPr lang="en-US" dirty="0"/>
+              <a:t> features</a:t>
             </a:r>
           </a:p>
           <a:p>
@@ -8937,7 +8896,15 @@
             <a:pPr lvl="1"/>
             <a:r>
               <a:rPr lang="en-US" dirty="0"/>
-              <a:t>10 correlated features</a:t>
+              <a:t>10 </a:t>
+            </a:r>
+            <a:r>
+              <a:rPr lang="en-US" b="1" dirty="0"/>
+              <a:t>correlated</a:t>
+            </a:r>
+            <a:r>
+              <a:rPr lang="en-US" dirty="0"/>
+              <a:t> features</a:t>
             </a:r>
           </a:p>
           <a:p>
@@ -8977,41 +8944,6 @@
           </a:p>
         </p:txBody>
       </p:sp>
-      <p:pic>
-        <p:nvPicPr>
-          <p:cNvPr id="5" name="Segnaposto contenuto 4">
-            <a:extLst>
-              <a:ext uri="{FF2B5EF4-FFF2-40B4-BE49-F238E27FC236}">
-                <a16:creationId xmlns:a16="http://schemas.microsoft.com/office/drawing/2014/main" id="{76E67CDE-0887-42B0-9936-DACFE00EBE0D}"/>
-              </a:ext>
-            </a:extLst>
-          </p:cNvPr>
-          <p:cNvPicPr>
-            <a:picLocks noGrp="1" noChangeAspect="1"/>
-          </p:cNvPicPr>
-          <p:nvPr>
-            <p:ph sz="half" idx="2"/>
-          </p:nvPr>
-        </p:nvPicPr>
-        <p:blipFill>
-          <a:blip r:embed="rId2">
-            <a:extLst>
-              <a:ext uri="{28A0092B-C50C-407E-A947-70E740481C1C}">
-                <a14:useLocalDpi xmlns:a14="http://schemas.microsoft.com/office/drawing/2010/main" val="0"/>
-              </a:ext>
-            </a:extLst>
-          </a:blip>
-          <a:stretch>
-            <a:fillRect/>
-          </a:stretch>
-        </p:blipFill>
-        <p:spPr>
-          <a:xfrm>
-            <a:off x="6172200" y="2205831"/>
-            <a:ext cx="5334000" cy="4000500"/>
-          </a:xfrm>
-        </p:spPr>
-      </p:pic>
     </p:spTree>
     <p:extLst>
       <p:ext uri="{BB962C8B-B14F-4D97-AF65-F5344CB8AC3E}">
@@ -9145,76 +9077,6 @@
           </a:p>
         </p:txBody>
       </p:sp>
-      <p:pic>
-        <p:nvPicPr>
-          <p:cNvPr id="7" name="Segnaposto contenuto 8">
-            <a:extLst>
-              <a:ext uri="{FF2B5EF4-FFF2-40B4-BE49-F238E27FC236}">
-                <a16:creationId xmlns:a16="http://schemas.microsoft.com/office/drawing/2014/main" id="{E0847D8F-5158-45A0-ABD6-47164754EAE1}"/>
-              </a:ext>
-            </a:extLst>
-          </p:cNvPr>
-          <p:cNvPicPr>
-            <a:picLocks noChangeAspect="1"/>
-          </p:cNvPicPr>
-          <p:nvPr/>
-        </p:nvPicPr>
-        <p:blipFill rotWithShape="1">
-          <a:blip r:embed="rId2">
-            <a:extLst>
-              <a:ext uri="{28A0092B-C50C-407E-A947-70E740481C1C}">
-                <a14:useLocalDpi xmlns:a14="http://schemas.microsoft.com/office/drawing/2010/main" val="0"/>
-              </a:ext>
-            </a:extLst>
-          </a:blip>
-          <a:srcRect r="-4" b="13029"/>
-          <a:stretch/>
-        </p:blipFill>
-        <p:spPr>
-          <a:xfrm>
-            <a:off x="7861238" y="933693"/>
-            <a:ext cx="3644962" cy="2377440"/>
-          </a:xfrm>
-          <a:prstGeom prst="rect">
-            <a:avLst/>
-          </a:prstGeom>
-        </p:spPr>
-      </p:pic>
-      <p:pic>
-        <p:nvPicPr>
-          <p:cNvPr id="6" name="Segnaposto contenuto 4">
-            <a:extLst>
-              <a:ext uri="{FF2B5EF4-FFF2-40B4-BE49-F238E27FC236}">
-                <a16:creationId xmlns:a16="http://schemas.microsoft.com/office/drawing/2014/main" id="{5BCCCDC7-4FB7-4083-BF85-CA9DED6FA23B}"/>
-              </a:ext>
-            </a:extLst>
-          </p:cNvPr>
-          <p:cNvPicPr>
-            <a:picLocks noChangeAspect="1"/>
-          </p:cNvPicPr>
-          <p:nvPr/>
-        </p:nvPicPr>
-        <p:blipFill rotWithShape="1">
-          <a:blip r:embed="rId3">
-            <a:extLst>
-              <a:ext uri="{28A0092B-C50C-407E-A947-70E740481C1C}">
-                <a14:useLocalDpi xmlns:a14="http://schemas.microsoft.com/office/drawing/2010/main" val="0"/>
-              </a:ext>
-            </a:extLst>
-          </a:blip>
-          <a:srcRect t="4612" r="-4" b="8417"/>
-          <a:stretch/>
-        </p:blipFill>
-        <p:spPr>
-          <a:xfrm>
-            <a:off x="7861238" y="3588301"/>
-            <a:ext cx="3644962" cy="2377440"/>
-          </a:xfrm>
-          <a:prstGeom prst="rect">
-            <a:avLst/>
-          </a:prstGeom>
-        </p:spPr>
-      </p:pic>
     </p:spTree>
     <p:extLst>
       <p:ext uri="{BB962C8B-B14F-4D97-AF65-F5344CB8AC3E}">
@@ -9932,14 +9794,6 @@
 <file path=ppt/slides/slide9.xml><?xml version="1.0" encoding="utf-8"?>
 <p:sld xmlns:a="http://schemas.openxmlformats.org/drawingml/2006/main" xmlns:r="http://schemas.openxmlformats.org/officeDocument/2006/relationships" xmlns:p="http://schemas.openxmlformats.org/presentationml/2006/main">
   <p:cSld>
-    <p:bg>
-      <p:bgPr>
-        <a:solidFill>
-          <a:schemeClr val="bg1"/>
-        </a:solidFill>
-        <a:effectLst/>
-      </p:bgPr>
-    </p:bg>
     <p:spTree>
       <p:nvGrpSpPr>
         <p:cNvPr id="1" name=""/>
@@ -9954,51 +9808,6 @@
           <a:chExt cx="0" cy="0"/>
         </a:xfrm>
       </p:grpSpPr>
-      <p:pic>
-        <p:nvPicPr>
-          <p:cNvPr id="33" name="Picture 24">
-            <a:extLst>
-              <a:ext uri="{FF2B5EF4-FFF2-40B4-BE49-F238E27FC236}">
-                <a16:creationId xmlns:a16="http://schemas.microsoft.com/office/drawing/2014/main" id="{EE253802-2FE2-4F1F-B256-423BEF09FB90}"/>
-              </a:ext>
-              <a:ext uri="{C183D7F6-B498-43B3-948B-1728B52AA6E4}">
-                <adec:decorative xmlns:adec="http://schemas.microsoft.com/office/drawing/2017/decorative" val="1"/>
-              </a:ext>
-            </a:extLst>
-          </p:cNvPr>
-          <p:cNvPicPr>
-            <a:picLocks noGrp="1" noRot="1" noChangeAspect="1" noMove="1" noResize="1" noEditPoints="1" noAdjustHandles="1" noChangeArrowheads="1" noChangeShapeType="1" noCrop="1"/>
-          </p:cNvPicPr>
-          <p:nvPr>
-            <p:extLst>
-              <p:ext uri="{386F3935-93C4-4BCD-93E2-E3B085C9AB24}">
-                <p16:designElem xmlns:p16="http://schemas.microsoft.com/office/powerpoint/2015/main" val="1"/>
-              </p:ext>
-            </p:extLst>
-          </p:nvPr>
-        </p:nvPicPr>
-        <p:blipFill>
-          <a:blip r:embed="rId2">
-            <a:extLst>
-              <a:ext uri="{28A0092B-C50C-407E-A947-70E740481C1C}">
-                <a14:useLocalDpi xmlns:a14="http://schemas.microsoft.com/office/drawing/2010/main" val="0"/>
-              </a:ext>
-            </a:extLst>
-          </a:blip>
-          <a:stretch>
-            <a:fillRect/>
-          </a:stretch>
-        </p:blipFill>
-        <p:spPr>
-          <a:xfrm>
-            <a:off x="0" y="0"/>
-            <a:ext cx="12192000" cy="1441450"/>
-          </a:xfrm>
-          <a:prstGeom prst="rect">
-            <a:avLst/>
-          </a:prstGeom>
-        </p:spPr>
-      </p:pic>
       <p:sp>
         <p:nvSpPr>
           <p:cNvPr id="20" name="Titolo 19">
@@ -10015,27 +9824,13 @@
             <p:ph type="title"/>
           </p:nvPr>
         </p:nvSpPr>
-        <p:spPr>
-          <a:xfrm>
-            <a:off x="619760" y="764373"/>
-            <a:ext cx="6832600" cy="1293028"/>
-          </a:xfrm>
-        </p:spPr>
-        <p:txBody>
-          <a:bodyPr vert="horz" lIns="91440" tIns="45720" rIns="91440" bIns="45720" rtlCol="0" anchor="ctr">
-            <a:normAutofit/>
-          </a:bodyPr>
+        <p:spPr/>
+        <p:txBody>
+          <a:bodyPr/>
           <a:lstStyle/>
           <a:p>
             <a:r>
-              <a:rPr lang="en-US" sz="4000" b="1" kern="1200" cap="all" baseline="0" dirty="0">
-                <a:solidFill>
-                  <a:schemeClr val="tx1"/>
-                </a:solidFill>
-                <a:latin typeface="+mj-lt"/>
-                <a:ea typeface="+mj-ea"/>
-                <a:cs typeface="+mj-cs"/>
-              </a:rPr>
+              <a:rPr lang="en-US" b="1" dirty="0"/>
               <a:t>Decision trees (I)</a:t>
             </a:r>
           </a:p>
@@ -10057,27 +9852,15 @@
             <p:ph sz="half" idx="1"/>
           </p:nvPr>
         </p:nvSpPr>
-        <p:spPr>
-          <a:xfrm>
-            <a:off x="619760" y="2194560"/>
-            <a:ext cx="6832600" cy="4024125"/>
-          </a:xfrm>
-        </p:spPr>
-        <p:txBody>
-          <a:bodyPr vert="horz" lIns="91440" tIns="45720" rIns="91440" bIns="45720" rtlCol="0">
+        <p:spPr/>
+        <p:txBody>
+          <a:bodyPr>
             <a:normAutofit/>
           </a:bodyPr>
           <a:lstStyle/>
           <a:p>
             <a:r>
-              <a:rPr lang="en-US" kern="1200" dirty="0">
-                <a:solidFill>
-                  <a:schemeClr val="tx1"/>
-                </a:solidFill>
-                <a:latin typeface="+mn-lt"/>
-                <a:ea typeface="+mn-ea"/>
-                <a:cs typeface="+mn-cs"/>
-              </a:rPr>
+              <a:rPr lang="en-US" dirty="0"/>
               <a:t>Iris dataset</a:t>
             </a:r>
           </a:p>
@@ -10096,151 +9879,101 @@
             </a:r>
           </a:p>
           <a:p>
-            <a:endParaRPr lang="en-US" kern="1200" dirty="0">
-              <a:solidFill>
-                <a:schemeClr val="tx1"/>
-              </a:solidFill>
-              <a:latin typeface="+mn-lt"/>
-              <a:ea typeface="+mn-ea"/>
-              <a:cs typeface="+mn-cs"/>
-            </a:endParaRPr>
-          </a:p>
-          <a:p>
-            <a:r>
-              <a:rPr lang="en-US" kern="1200" dirty="0">
-                <a:solidFill>
-                  <a:schemeClr val="tx1"/>
-                </a:solidFill>
-                <a:latin typeface="+mn-lt"/>
-                <a:ea typeface="+mn-ea"/>
-                <a:cs typeface="+mn-cs"/>
-              </a:rPr>
-              <a:t>Accuracy</a:t>
-            </a:r>
+            <a:pPr lvl="1"/>
             <a:endParaRPr lang="en-US" dirty="0"/>
           </a:p>
           <a:p>
+            <a:r>
+              <a:rPr lang="en-US" dirty="0"/>
+              <a:t>Accuracy:</a:t>
+            </a:r>
+          </a:p>
+          <a:p>
             <a:pPr lvl="1"/>
             <a:r>
               <a:rPr lang="en-US" dirty="0"/>
-              <a:t>Without boosting: </a:t>
-            </a:r>
-            <a:r>
-              <a:rPr lang="en-US" kern="1200" dirty="0">
-                <a:solidFill>
-                  <a:schemeClr val="tx1"/>
-                </a:solidFill>
-                <a:latin typeface="+mn-lt"/>
-                <a:ea typeface="+mn-ea"/>
-                <a:cs typeface="+mn-cs"/>
-              </a:rPr>
-              <a:t>µ = 92.4, σ = 3.71</a:t>
+              <a:t>Without boosting: µ = 92.4, σ = 3.71</a:t>
             </a:r>
           </a:p>
           <a:p>
             <a:pPr lvl="1"/>
             <a:r>
-              <a:rPr lang="en-US" kern="1200" dirty="0">
-                <a:solidFill>
-                  <a:schemeClr val="tx1"/>
-                </a:solidFill>
-                <a:latin typeface="+mn-lt"/>
-                <a:ea typeface="+mn-ea"/>
-                <a:cs typeface="+mn-cs"/>
-              </a:rPr>
-              <a:t>With </a:t>
-            </a:r>
-            <a:r>
               <a:rPr lang="en-US" dirty="0"/>
-              <a:t>boosting: µ = 94.6, σ = 3.65</a:t>
-            </a:r>
-            <a:endParaRPr lang="en-US" kern="1200" dirty="0">
-              <a:solidFill>
-                <a:schemeClr val="tx1"/>
-              </a:solidFill>
-              <a:latin typeface="+mn-lt"/>
-              <a:ea typeface="+mn-ea"/>
-              <a:cs typeface="+mn-cs"/>
-            </a:endParaRPr>
-          </a:p>
-        </p:txBody>
-      </p:sp>
-      <p:pic>
-        <p:nvPicPr>
-          <p:cNvPr id="6" name="Segnaposto contenuto 5">
+              <a:t>With boosting: µ = 94.6, σ = 3.65</a:t>
+            </a:r>
+          </a:p>
+        </p:txBody>
+      </p:sp>
+      <p:sp>
+        <p:nvSpPr>
+          <p:cNvPr id="10" name="Segnaposto contenuto 9">
             <a:extLst>
               <a:ext uri="{FF2B5EF4-FFF2-40B4-BE49-F238E27FC236}">
-                <a16:creationId xmlns:a16="http://schemas.microsoft.com/office/drawing/2014/main" id="{344B735E-4B68-42C5-B621-CAFA8512334C}"/>
+                <a16:creationId xmlns:a16="http://schemas.microsoft.com/office/drawing/2014/main" id="{8B19D1E2-54E5-4FB6-977B-C874F4D9B1D5}"/>
               </a:ext>
             </a:extLst>
           </p:cNvPr>
-          <p:cNvPicPr>
-            <a:picLocks noGrp="1" noChangeAspect="1"/>
-          </p:cNvPicPr>
+          <p:cNvSpPr>
+            <a:spLocks noGrp="1"/>
+          </p:cNvSpPr>
           <p:nvPr>
             <p:ph sz="half" idx="2"/>
           </p:nvPr>
-        </p:nvPicPr>
-        <p:blipFill rotWithShape="1">
-          <a:blip r:embed="rId3">
-            <a:extLst>
-              <a:ext uri="{28A0092B-C50C-407E-A947-70E740481C1C}">
-                <a14:useLocalDpi xmlns:a14="http://schemas.microsoft.com/office/drawing/2010/main" val="0"/>
-              </a:ext>
-            </a:extLst>
-          </a:blip>
-          <a:srcRect r="-4" b="13029"/>
-          <a:stretch/>
-        </p:blipFill>
-        <p:spPr>
-          <a:xfrm>
-            <a:off x="7861238" y="933693"/>
-            <a:ext cx="3644962" cy="2377440"/>
-          </a:xfrm>
-          <a:prstGeom prst="rect">
-            <a:avLst/>
-          </a:prstGeom>
-        </p:spPr>
-      </p:pic>
-      <p:pic>
-        <p:nvPicPr>
-          <p:cNvPr id="4" name="Immagine 3">
-            <a:extLst>
-              <a:ext uri="{FF2B5EF4-FFF2-40B4-BE49-F238E27FC236}">
-                <a16:creationId xmlns:a16="http://schemas.microsoft.com/office/drawing/2014/main" id="{F0C0799D-613F-4AA4-997E-D14E4F4E1EBC}"/>
-              </a:ext>
-            </a:extLst>
-          </p:cNvPr>
-          <p:cNvPicPr>
-            <a:picLocks noChangeAspect="1"/>
-          </p:cNvPicPr>
-          <p:nvPr/>
-        </p:nvPicPr>
-        <p:blipFill rotWithShape="1">
-          <a:blip r:embed="rId4">
-            <a:extLst>
-              <a:ext uri="{28A0092B-C50C-407E-A947-70E740481C1C}">
-                <a14:useLocalDpi xmlns:a14="http://schemas.microsoft.com/office/drawing/2010/main" val="0"/>
-              </a:ext>
-            </a:extLst>
-          </a:blip>
-          <a:srcRect r="-4" b="13029"/>
-          <a:stretch/>
-        </p:blipFill>
-        <p:spPr>
-          <a:xfrm>
-            <a:off x="7861238" y="3588301"/>
-            <a:ext cx="3644962" cy="2377440"/>
-          </a:xfrm>
-          <a:prstGeom prst="rect">
-            <a:avLst/>
-          </a:prstGeom>
-        </p:spPr>
-      </p:pic>
+        </p:nvSpPr>
+        <p:spPr/>
+        <p:txBody>
+          <a:bodyPr/>
+          <a:lstStyle/>
+          <a:p>
+            <a:r>
+              <a:rPr lang="en-US" dirty="0"/>
+              <a:t>Vowel dataset</a:t>
+            </a:r>
+          </a:p>
+          <a:p>
+            <a:pPr lvl="1"/>
+            <a:r>
+              <a:rPr lang="en-US" dirty="0"/>
+              <a:t>10 correlated features</a:t>
+            </a:r>
+          </a:p>
+          <a:p>
+            <a:pPr lvl="1"/>
+            <a:r>
+              <a:rPr lang="en-US" dirty="0"/>
+              <a:t>11 classes</a:t>
+            </a:r>
+          </a:p>
+          <a:p>
+            <a:pPr lvl="1"/>
+            <a:endParaRPr lang="en-US" dirty="0"/>
+          </a:p>
+          <a:p>
+            <a:r>
+              <a:rPr lang="en-US" dirty="0"/>
+              <a:t>Accuracy:</a:t>
+            </a:r>
+          </a:p>
+          <a:p>
+            <a:pPr lvl="1"/>
+            <a:r>
+              <a:rPr lang="en-US" dirty="0"/>
+              <a:t>Without boosting: µ = 64.1, σ = 4</a:t>
+            </a:r>
+          </a:p>
+          <a:p>
+            <a:pPr lvl="1"/>
+            <a:r>
+              <a:rPr lang="en-US" dirty="0"/>
+              <a:t>With boosting: µ = 86.9, σ = 3.07</a:t>
+            </a:r>
+          </a:p>
+        </p:txBody>
+      </p:sp>
     </p:spTree>
     <p:extLst>
       <p:ext uri="{BB962C8B-B14F-4D97-AF65-F5344CB8AC3E}">
-        <p14:creationId xmlns:p14="http://schemas.microsoft.com/office/powerpoint/2010/main" val="568158431"/>
+        <p14:creationId xmlns:p14="http://schemas.microsoft.com/office/powerpoint/2010/main" val="3428520635"/>
       </p:ext>
     </p:extLst>
   </p:cSld>

</xml_diff>